<commit_message>
[AE-727] advance/fast-forward to 7a236dcf8e4721472cea6f1ae7b652618c118f43  https://github.com/apache/spark.git
</commit_message>
<xml_diff>
--- a/docs/img/streaming-figures.pptx
+++ b/docs/img/streaming-figures.pptx
@@ -292,7 +292,7 @@
           <a:p>
             <a:fld id="{FEA1CA3E-06EE-4249-8BD0-4D0D9C6971D8}" type="datetimeFigureOut">
               <a:rPr lang="en-US" smtClean="0"/>
-              <a:t>1/23/14</a:t>
+              <a:t>9/6/14</a:t>
             </a:fld>
             <a:endParaRPr lang="en-US"/>
           </a:p>
@@ -462,7 +462,7 @@
           <a:p>
             <a:fld id="{FEA1CA3E-06EE-4249-8BD0-4D0D9C6971D8}" type="datetimeFigureOut">
               <a:rPr lang="en-US" smtClean="0"/>
-              <a:t>1/23/14</a:t>
+              <a:t>9/6/14</a:t>
             </a:fld>
             <a:endParaRPr lang="en-US"/>
           </a:p>
@@ -642,7 +642,7 @@
           <a:p>
             <a:fld id="{FEA1CA3E-06EE-4249-8BD0-4D0D9C6971D8}" type="datetimeFigureOut">
               <a:rPr lang="en-US" smtClean="0"/>
-              <a:t>1/23/14</a:t>
+              <a:t>9/6/14</a:t>
             </a:fld>
             <a:endParaRPr lang="en-US"/>
           </a:p>
@@ -812,7 +812,7 @@
           <a:p>
             <a:fld id="{FEA1CA3E-06EE-4249-8BD0-4D0D9C6971D8}" type="datetimeFigureOut">
               <a:rPr lang="en-US" smtClean="0"/>
-              <a:t>1/23/14</a:t>
+              <a:t>9/6/14</a:t>
             </a:fld>
             <a:endParaRPr lang="en-US"/>
           </a:p>
@@ -1058,7 +1058,7 @@
           <a:p>
             <a:fld id="{FEA1CA3E-06EE-4249-8BD0-4D0D9C6971D8}" type="datetimeFigureOut">
               <a:rPr lang="en-US" smtClean="0"/>
-              <a:t>1/23/14</a:t>
+              <a:t>9/6/14</a:t>
             </a:fld>
             <a:endParaRPr lang="en-US"/>
           </a:p>
@@ -1346,7 +1346,7 @@
           <a:p>
             <a:fld id="{FEA1CA3E-06EE-4249-8BD0-4D0D9C6971D8}" type="datetimeFigureOut">
               <a:rPr lang="en-US" smtClean="0"/>
-              <a:t>1/23/14</a:t>
+              <a:t>9/6/14</a:t>
             </a:fld>
             <a:endParaRPr lang="en-US"/>
           </a:p>
@@ -1768,7 +1768,7 @@
           <a:p>
             <a:fld id="{FEA1CA3E-06EE-4249-8BD0-4D0D9C6971D8}" type="datetimeFigureOut">
               <a:rPr lang="en-US" smtClean="0"/>
-              <a:t>1/23/14</a:t>
+              <a:t>9/6/14</a:t>
             </a:fld>
             <a:endParaRPr lang="en-US"/>
           </a:p>
@@ -1886,7 +1886,7 @@
           <a:p>
             <a:fld id="{FEA1CA3E-06EE-4249-8BD0-4D0D9C6971D8}" type="datetimeFigureOut">
               <a:rPr lang="en-US" smtClean="0"/>
-              <a:t>1/23/14</a:t>
+              <a:t>9/6/14</a:t>
             </a:fld>
             <a:endParaRPr lang="en-US"/>
           </a:p>
@@ -1981,7 +1981,7 @@
           <a:p>
             <a:fld id="{FEA1CA3E-06EE-4249-8BD0-4D0D9C6971D8}" type="datetimeFigureOut">
               <a:rPr lang="en-US" smtClean="0"/>
-              <a:t>1/23/14</a:t>
+              <a:t>9/6/14</a:t>
             </a:fld>
             <a:endParaRPr lang="en-US"/>
           </a:p>
@@ -2258,7 +2258,7 @@
           <a:p>
             <a:fld id="{FEA1CA3E-06EE-4249-8BD0-4D0D9C6971D8}" type="datetimeFigureOut">
               <a:rPr lang="en-US" smtClean="0"/>
-              <a:t>1/23/14</a:t>
+              <a:t>9/6/14</a:t>
             </a:fld>
             <a:endParaRPr lang="en-US"/>
           </a:p>
@@ -2511,7 +2511,7 @@
           <a:p>
             <a:fld id="{FEA1CA3E-06EE-4249-8BD0-4D0D9C6971D8}" type="datetimeFigureOut">
               <a:rPr lang="en-US" smtClean="0"/>
-              <a:t>1/23/14</a:t>
+              <a:t>9/6/14</a:t>
             </a:fld>
             <a:endParaRPr lang="en-US"/>
           </a:p>
@@ -2724,7 +2724,7 @@
           <a:p>
             <a:fld id="{FEA1CA3E-06EE-4249-8BD0-4D0D9C6971D8}" type="datetimeFigureOut">
               <a:rPr lang="en-US" smtClean="0"/>
-              <a:t>1/23/14</a:t>
+              <a:t>9/6/14</a:t>
             </a:fld>
             <a:endParaRPr lang="en-US"/>
           </a:p>
@@ -3541,7 +3541,7 @@
                   <a:pPr algn="ctr"/>
                   <a:r>
                     <a:rPr lang="en-US" b="1" dirty="0" smtClean="0"/>
-                    <a:t>HDFS</a:t>
+                    <a:t>HDFS/S3</a:t>
                   </a:r>
                   <a:endParaRPr lang="en-US" b="1" dirty="0"/>
                 </a:p>
@@ -3583,8 +3583,8 @@
                 <a:p>
                   <a:pPr algn="ctr"/>
                   <a:r>
-                    <a:rPr lang="en-US" b="1" dirty="0" err="1" smtClean="0"/>
-                    <a:t>ZeroMQ</a:t>
+                    <a:rPr lang="en-US" b="1" dirty="0" smtClean="0"/>
+                    <a:t>Kinesis</a:t>
                   </a:r>
                   <a:endParaRPr lang="en-US" b="1" dirty="0"/>
                 </a:p>

</xml_diff>

<commit_message>
reset commit to 2f9b2bd7844ee8393dc9c319f4fefedf95f5e460 and 37b10086bf55560c087062f62f942b1102435a95 from https://github.com/apache/spark/tree/branch-1.1 for 1.1-rc4 release
</commit_message>
<xml_diff>
--- a/docs/img/streaming-figures.pptx
+++ b/docs/img/streaming-figures.pptx
@@ -292,7 +292,7 @@
           <a:p>
             <a:fld id="{FEA1CA3E-06EE-4249-8BD0-4D0D9C6971D8}" type="datetimeFigureOut">
               <a:rPr lang="en-US" smtClean="0"/>
-              <a:t>9/6/14</a:t>
+              <a:t>1/23/14</a:t>
             </a:fld>
             <a:endParaRPr lang="en-US"/>
           </a:p>
@@ -462,7 +462,7 @@
           <a:p>
             <a:fld id="{FEA1CA3E-06EE-4249-8BD0-4D0D9C6971D8}" type="datetimeFigureOut">
               <a:rPr lang="en-US" smtClean="0"/>
-              <a:t>9/6/14</a:t>
+              <a:t>1/23/14</a:t>
             </a:fld>
             <a:endParaRPr lang="en-US"/>
           </a:p>
@@ -642,7 +642,7 @@
           <a:p>
             <a:fld id="{FEA1CA3E-06EE-4249-8BD0-4D0D9C6971D8}" type="datetimeFigureOut">
               <a:rPr lang="en-US" smtClean="0"/>
-              <a:t>9/6/14</a:t>
+              <a:t>1/23/14</a:t>
             </a:fld>
             <a:endParaRPr lang="en-US"/>
           </a:p>
@@ -812,7 +812,7 @@
           <a:p>
             <a:fld id="{FEA1CA3E-06EE-4249-8BD0-4D0D9C6971D8}" type="datetimeFigureOut">
               <a:rPr lang="en-US" smtClean="0"/>
-              <a:t>9/6/14</a:t>
+              <a:t>1/23/14</a:t>
             </a:fld>
             <a:endParaRPr lang="en-US"/>
           </a:p>
@@ -1058,7 +1058,7 @@
           <a:p>
             <a:fld id="{FEA1CA3E-06EE-4249-8BD0-4D0D9C6971D8}" type="datetimeFigureOut">
               <a:rPr lang="en-US" smtClean="0"/>
-              <a:t>9/6/14</a:t>
+              <a:t>1/23/14</a:t>
             </a:fld>
             <a:endParaRPr lang="en-US"/>
           </a:p>
@@ -1346,7 +1346,7 @@
           <a:p>
             <a:fld id="{FEA1CA3E-06EE-4249-8BD0-4D0D9C6971D8}" type="datetimeFigureOut">
               <a:rPr lang="en-US" smtClean="0"/>
-              <a:t>9/6/14</a:t>
+              <a:t>1/23/14</a:t>
             </a:fld>
             <a:endParaRPr lang="en-US"/>
           </a:p>
@@ -1768,7 +1768,7 @@
           <a:p>
             <a:fld id="{FEA1CA3E-06EE-4249-8BD0-4D0D9C6971D8}" type="datetimeFigureOut">
               <a:rPr lang="en-US" smtClean="0"/>
-              <a:t>9/6/14</a:t>
+              <a:t>1/23/14</a:t>
             </a:fld>
             <a:endParaRPr lang="en-US"/>
           </a:p>
@@ -1886,7 +1886,7 @@
           <a:p>
             <a:fld id="{FEA1CA3E-06EE-4249-8BD0-4D0D9C6971D8}" type="datetimeFigureOut">
               <a:rPr lang="en-US" smtClean="0"/>
-              <a:t>9/6/14</a:t>
+              <a:t>1/23/14</a:t>
             </a:fld>
             <a:endParaRPr lang="en-US"/>
           </a:p>
@@ -1981,7 +1981,7 @@
           <a:p>
             <a:fld id="{FEA1CA3E-06EE-4249-8BD0-4D0D9C6971D8}" type="datetimeFigureOut">
               <a:rPr lang="en-US" smtClean="0"/>
-              <a:t>9/6/14</a:t>
+              <a:t>1/23/14</a:t>
             </a:fld>
             <a:endParaRPr lang="en-US"/>
           </a:p>
@@ -2258,7 +2258,7 @@
           <a:p>
             <a:fld id="{FEA1CA3E-06EE-4249-8BD0-4D0D9C6971D8}" type="datetimeFigureOut">
               <a:rPr lang="en-US" smtClean="0"/>
-              <a:t>9/6/14</a:t>
+              <a:t>1/23/14</a:t>
             </a:fld>
             <a:endParaRPr lang="en-US"/>
           </a:p>
@@ -2511,7 +2511,7 @@
           <a:p>
             <a:fld id="{FEA1CA3E-06EE-4249-8BD0-4D0D9C6971D8}" type="datetimeFigureOut">
               <a:rPr lang="en-US" smtClean="0"/>
-              <a:t>9/6/14</a:t>
+              <a:t>1/23/14</a:t>
             </a:fld>
             <a:endParaRPr lang="en-US"/>
           </a:p>
@@ -2724,7 +2724,7 @@
           <a:p>
             <a:fld id="{FEA1CA3E-06EE-4249-8BD0-4D0D9C6971D8}" type="datetimeFigureOut">
               <a:rPr lang="en-US" smtClean="0"/>
-              <a:t>9/6/14</a:t>
+              <a:t>1/23/14</a:t>
             </a:fld>
             <a:endParaRPr lang="en-US"/>
           </a:p>
@@ -3541,7 +3541,7 @@
                   <a:pPr algn="ctr"/>
                   <a:r>
                     <a:rPr lang="en-US" b="1" dirty="0" smtClean="0"/>
-                    <a:t>HDFS/S3</a:t>
+                    <a:t>HDFS</a:t>
                   </a:r>
                   <a:endParaRPr lang="en-US" b="1" dirty="0"/>
                 </a:p>
@@ -3583,8 +3583,8 @@
                 <a:p>
                   <a:pPr algn="ctr"/>
                   <a:r>
-                    <a:rPr lang="en-US" b="1" dirty="0" smtClean="0"/>
-                    <a:t>Kinesis</a:t>
+                    <a:rPr lang="en-US" b="1" dirty="0" err="1" smtClean="0"/>
+                    <a:t>ZeroMQ</a:t>
                   </a:r>
                   <a:endParaRPr lang="en-US" b="1" dirty="0"/>
                 </a:p>

</xml_diff>

<commit_message>
[AE-880] first update with latest files commit lable 9eac5fee64def9a18d8961069f631a176f339a5b
</commit_message>
<xml_diff>
--- a/docs/img/streaming-figures.pptx
+++ b/docs/img/streaming-figures.pptx
@@ -292,7 +292,7 @@
           <a:p>
             <a:fld id="{FEA1CA3E-06EE-4249-8BD0-4D0D9C6971D8}" type="datetimeFigureOut">
               <a:rPr lang="en-US" smtClean="0"/>
-              <a:t>1/23/14</a:t>
+              <a:t>9/6/14</a:t>
             </a:fld>
             <a:endParaRPr lang="en-US"/>
           </a:p>
@@ -462,7 +462,7 @@
           <a:p>
             <a:fld id="{FEA1CA3E-06EE-4249-8BD0-4D0D9C6971D8}" type="datetimeFigureOut">
               <a:rPr lang="en-US" smtClean="0"/>
-              <a:t>1/23/14</a:t>
+              <a:t>9/6/14</a:t>
             </a:fld>
             <a:endParaRPr lang="en-US"/>
           </a:p>
@@ -642,7 +642,7 @@
           <a:p>
             <a:fld id="{FEA1CA3E-06EE-4249-8BD0-4D0D9C6971D8}" type="datetimeFigureOut">
               <a:rPr lang="en-US" smtClean="0"/>
-              <a:t>1/23/14</a:t>
+              <a:t>9/6/14</a:t>
             </a:fld>
             <a:endParaRPr lang="en-US"/>
           </a:p>
@@ -812,7 +812,7 @@
           <a:p>
             <a:fld id="{FEA1CA3E-06EE-4249-8BD0-4D0D9C6971D8}" type="datetimeFigureOut">
               <a:rPr lang="en-US" smtClean="0"/>
-              <a:t>1/23/14</a:t>
+              <a:t>9/6/14</a:t>
             </a:fld>
             <a:endParaRPr lang="en-US"/>
           </a:p>
@@ -1058,7 +1058,7 @@
           <a:p>
             <a:fld id="{FEA1CA3E-06EE-4249-8BD0-4D0D9C6971D8}" type="datetimeFigureOut">
               <a:rPr lang="en-US" smtClean="0"/>
-              <a:t>1/23/14</a:t>
+              <a:t>9/6/14</a:t>
             </a:fld>
             <a:endParaRPr lang="en-US"/>
           </a:p>
@@ -1346,7 +1346,7 @@
           <a:p>
             <a:fld id="{FEA1CA3E-06EE-4249-8BD0-4D0D9C6971D8}" type="datetimeFigureOut">
               <a:rPr lang="en-US" smtClean="0"/>
-              <a:t>1/23/14</a:t>
+              <a:t>9/6/14</a:t>
             </a:fld>
             <a:endParaRPr lang="en-US"/>
           </a:p>
@@ -1768,7 +1768,7 @@
           <a:p>
             <a:fld id="{FEA1CA3E-06EE-4249-8BD0-4D0D9C6971D8}" type="datetimeFigureOut">
               <a:rPr lang="en-US" smtClean="0"/>
-              <a:t>1/23/14</a:t>
+              <a:t>9/6/14</a:t>
             </a:fld>
             <a:endParaRPr lang="en-US"/>
           </a:p>
@@ -1886,7 +1886,7 @@
           <a:p>
             <a:fld id="{FEA1CA3E-06EE-4249-8BD0-4D0D9C6971D8}" type="datetimeFigureOut">
               <a:rPr lang="en-US" smtClean="0"/>
-              <a:t>1/23/14</a:t>
+              <a:t>9/6/14</a:t>
             </a:fld>
             <a:endParaRPr lang="en-US"/>
           </a:p>
@@ -1981,7 +1981,7 @@
           <a:p>
             <a:fld id="{FEA1CA3E-06EE-4249-8BD0-4D0D9C6971D8}" type="datetimeFigureOut">
               <a:rPr lang="en-US" smtClean="0"/>
-              <a:t>1/23/14</a:t>
+              <a:t>9/6/14</a:t>
             </a:fld>
             <a:endParaRPr lang="en-US"/>
           </a:p>
@@ -2258,7 +2258,7 @@
           <a:p>
             <a:fld id="{FEA1CA3E-06EE-4249-8BD0-4D0D9C6971D8}" type="datetimeFigureOut">
               <a:rPr lang="en-US" smtClean="0"/>
-              <a:t>1/23/14</a:t>
+              <a:t>9/6/14</a:t>
             </a:fld>
             <a:endParaRPr lang="en-US"/>
           </a:p>
@@ -2511,7 +2511,7 @@
           <a:p>
             <a:fld id="{FEA1CA3E-06EE-4249-8BD0-4D0D9C6971D8}" type="datetimeFigureOut">
               <a:rPr lang="en-US" smtClean="0"/>
-              <a:t>1/23/14</a:t>
+              <a:t>9/6/14</a:t>
             </a:fld>
             <a:endParaRPr lang="en-US"/>
           </a:p>
@@ -2724,7 +2724,7 @@
           <a:p>
             <a:fld id="{FEA1CA3E-06EE-4249-8BD0-4D0D9C6971D8}" type="datetimeFigureOut">
               <a:rPr lang="en-US" smtClean="0"/>
-              <a:t>1/23/14</a:t>
+              <a:t>9/6/14</a:t>
             </a:fld>
             <a:endParaRPr lang="en-US"/>
           </a:p>
@@ -3541,7 +3541,7 @@
                   <a:pPr algn="ctr"/>
                   <a:r>
                     <a:rPr lang="en-US" b="1" dirty="0" smtClean="0"/>
-                    <a:t>HDFS</a:t>
+                    <a:t>HDFS/S3</a:t>
                   </a:r>
                   <a:endParaRPr lang="en-US" b="1" dirty="0"/>
                 </a:p>
@@ -3583,8 +3583,8 @@
                 <a:p>
                   <a:pPr algn="ctr"/>
                   <a:r>
-                    <a:rPr lang="en-US" b="1" dirty="0" err="1" smtClean="0"/>
-                    <a:t>ZeroMQ</a:t>
+                    <a:rPr lang="en-US" b="1" dirty="0" smtClean="0"/>
+                    <a:t>Kinesis</a:t>
                   </a:r>
                   <a:endParaRPr lang="en-US" b="1" dirty="0"/>
                 </a:p>

</xml_diff>